<commit_message>
Changed http links to use https. Minor final presentation tweaks.
</commit_message>
<xml_diff>
--- a/presentations/Milestone 6 Report Out.pptx
+++ b/presentations/Milestone 6 Report Out.pptx
@@ -1748,7 +1748,7 @@
         </p:nvSpPr>
         <p:spPr>
           <a:xfrm>
-            <a:off x="381300" y="685800"/>
+            <a:off x="381000" y="685800"/>
             <a:ext cx="6096000" cy="3429000"/>
           </a:xfrm>
           <a:custGeom>
@@ -13369,14 +13369,14 @@
               <a:buNone/>
             </a:pPr>
             <a:r>
-              <a:rPr lang="en" sz="1800" b="1">
+              <a:rPr lang="en" sz="1800" b="1" dirty="0">
                 <a:solidFill>
                   <a:srgbClr val="000000"/>
                 </a:solidFill>
               </a:rPr>
               <a:t>Team Member Main Priorities</a:t>
             </a:r>
-            <a:endParaRPr sz="1800" b="1">
+            <a:endParaRPr sz="1800" b="1" dirty="0">
               <a:solidFill>
                 <a:srgbClr val="000000"/>
               </a:solidFill>
@@ -13397,14 +13397,14 @@
               <a:buChar char="●"/>
             </a:pPr>
             <a:r>
-              <a:rPr lang="en" sz="1600">
+              <a:rPr lang="en" sz="1600" dirty="0">
                 <a:solidFill>
                   <a:srgbClr val="000000"/>
                 </a:solidFill>
               </a:rPr>
               <a:t>Jenn - Unit testing, ability to update success stories and what’s new</a:t>
             </a:r>
-            <a:endParaRPr sz="1600">
+            <a:endParaRPr sz="1600" dirty="0">
               <a:solidFill>
                 <a:srgbClr val="000000"/>
               </a:solidFill>
@@ -13425,14 +13425,14 @@
               <a:buChar char="●"/>
             </a:pPr>
             <a:r>
-              <a:rPr lang="en" sz="1600">
+              <a:rPr lang="en" sz="1600" dirty="0">
                 <a:solidFill>
                   <a:srgbClr val="000000"/>
                 </a:solidFill>
               </a:rPr>
               <a:t>Oscar - Create idea modal, contact us page</a:t>
             </a:r>
-            <a:endParaRPr sz="1600">
+            <a:endParaRPr sz="1600" dirty="0">
               <a:solidFill>
                 <a:srgbClr val="000000"/>
               </a:solidFill>
@@ -13453,14 +13453,14 @@
               <a:buChar char="●"/>
             </a:pPr>
             <a:r>
-              <a:rPr lang="en" sz="1600">
+              <a:rPr lang="en" sz="1600" dirty="0">
                 <a:solidFill>
                   <a:srgbClr val="000000"/>
                 </a:solidFill>
               </a:rPr>
               <a:t>Quinn -  User manual, idea filtering by title and author</a:t>
             </a:r>
-            <a:endParaRPr sz="1600">
+            <a:endParaRPr sz="1600" dirty="0">
               <a:solidFill>
                 <a:srgbClr val="000000"/>
               </a:solidFill>
@@ -13481,14 +13481,22 @@
               <a:buChar char="●"/>
             </a:pPr>
             <a:r>
-              <a:rPr lang="en" sz="1600">
+              <a:rPr lang="en" sz="1600" dirty="0">
                 <a:solidFill>
                   <a:srgbClr val="000000"/>
                 </a:solidFill>
               </a:rPr>
-              <a:t>Shawn - Ideas page overhaul, FAQ improvements, profile page improvements</a:t>
-            </a:r>
-            <a:endParaRPr sz="1600">
+              <a:t>Shawn - Ideas page overhaul, FAQ improvements, profile page improvements, </a:t>
+            </a:r>
+            <a:r>
+              <a:rPr lang="en-CA" sz="1600" dirty="0" err="1">
+                <a:solidFill>
+                  <a:srgbClr val="000000"/>
+                </a:solidFill>
+              </a:rPr>
+              <a:t>themeing</a:t>
+            </a:r>
+            <a:endParaRPr sz="1600" dirty="0">
               <a:solidFill>
                 <a:srgbClr val="000000"/>
               </a:solidFill>
@@ -13509,14 +13517,14 @@
               <a:buChar char="●"/>
             </a:pPr>
             <a:r>
-              <a:rPr lang="en" sz="1600">
+              <a:rPr lang="en" sz="1600" dirty="0">
                 <a:solidFill>
                   <a:srgbClr val="000000"/>
                 </a:solidFill>
               </a:rPr>
               <a:t>Tristan - Usability analysis compilation, navigation bar improvements, idea improvements</a:t>
             </a:r>
-            <a:endParaRPr sz="1600">
+            <a:endParaRPr sz="1600" dirty="0">
               <a:solidFill>
                 <a:srgbClr val="000000"/>
               </a:solidFill>
@@ -13537,14 +13545,14 @@
               <a:buChar char="●"/>
             </a:pPr>
             <a:r>
-              <a:rPr lang="en" sz="1600">
+              <a:rPr lang="en" sz="1600" dirty="0">
                 <a:solidFill>
                   <a:srgbClr val="000000"/>
                 </a:solidFill>
               </a:rPr>
               <a:t>Wilson - Resolved registration-related bugs, ideas page overhaul</a:t>
             </a:r>
-            <a:endParaRPr sz="1600">
+            <a:endParaRPr sz="1600" dirty="0">
               <a:solidFill>
                 <a:srgbClr val="000000"/>
               </a:solidFill>
@@ -13561,14 +13569,14 @@
               <a:buNone/>
             </a:pPr>
             <a:r>
-              <a:rPr lang="en" sz="1600" b="1">
+              <a:rPr lang="en" sz="1600" b="1" dirty="0">
                 <a:solidFill>
                   <a:srgbClr val="000000"/>
                 </a:solidFill>
               </a:rPr>
               <a:t>There was overlap of these responsibilities among other group members.</a:t>
             </a:r>
-            <a:endParaRPr sz="1600">
+            <a:endParaRPr sz="1600" dirty="0">
               <a:solidFill>
                 <a:srgbClr val="000000"/>
               </a:solidFill>
@@ -13585,14 +13593,14 @@
               <a:buNone/>
             </a:pPr>
             <a:r>
-              <a:rPr lang="en" sz="1600" i="1">
+              <a:rPr lang="en" sz="1600" i="1" dirty="0">
                 <a:solidFill>
                   <a:srgbClr val="000000"/>
                 </a:solidFill>
               </a:rPr>
               <a:t>ie. 	All group members were responsible for identifying and resolving bugs within the</a:t>
             </a:r>
-            <a:endParaRPr sz="1600" i="1">
+            <a:endParaRPr sz="1600" i="1" dirty="0">
               <a:solidFill>
                 <a:srgbClr val="000000"/>
               </a:solidFill>
@@ -13609,14 +13617,14 @@
               <a:buNone/>
             </a:pPr>
             <a:r>
-              <a:rPr lang="en" sz="1600" i="1">
+              <a:rPr lang="en" sz="1600" i="1" dirty="0">
                 <a:solidFill>
                   <a:srgbClr val="000000"/>
                 </a:solidFill>
               </a:rPr>
               <a:t>	application as identified within our GitHub issues.</a:t>
             </a:r>
-            <a:endParaRPr sz="1600" i="1">
+            <a:endParaRPr sz="1600" i="1" dirty="0">
               <a:solidFill>
                 <a:srgbClr val="000000"/>
               </a:solidFill>

</xml_diff>